<commit_message>
Añadidos diapositivas y contenidos al trabajo
Mañana necesito las últimas partes para finalizarlo y revisarlo me
gustaría que cuando termine de ponerlo bien lo leyerais para ver
vuestra opinión chin chin no daysuki nandaio
</commit_message>
<xml_diff>
--- a/Practica1/PresentacionlA.pptx
+++ b/Practica1/PresentacionlA.pptx
@@ -200,7 +200,7 @@
             <a:fld id="{BF26D1C3-BD64-4F4C-B674-447300629CDA}" type="datetimeFigureOut">
               <a:rPr lang="es-ES" smtClean="0"/>
               <a:pPr/>
-              <a:t>01/03/15</a:t>
+              <a:t>05/03/15</a:t>
             </a:fld>
             <a:endParaRPr lang="en-US"/>
           </a:p>
@@ -2047,7 +2047,7 @@
             <a:fld id="{025A5881-F1B6-40FD-811F-146D742BC070}" type="datetime1">
               <a:rPr lang="es-ES" smtClean="0"/>
               <a:pPr/>
-              <a:t>01/03/15</a:t>
+              <a:t>05/03/15</a:t>
             </a:fld>
             <a:endParaRPr lang="en-US"/>
           </a:p>
@@ -3099,15 +3099,7 @@
             </a:r>
             <a:r>
               <a:rPr lang="en-US" dirty="0" err="1" smtClean="0"/>
-              <a:t>lgor</a:t>
-            </a:r>
-            <a:r>
-              <a:rPr lang="en-US" dirty="0" err="1" smtClean="0"/>
-              <a:t>i</a:t>
-            </a:r>
-            <a:r>
-              <a:rPr lang="en-US" dirty="0" err="1" smtClean="0"/>
-              <a:t>tmos</a:t>
+              <a:t>lgoritmos</a:t>
             </a:r>
             <a:r>
               <a:rPr lang="en-US" dirty="0" smtClean="0"/>
@@ -3115,11 +3107,7 @@
             </a:r>
             <a:r>
               <a:rPr lang="en-US" dirty="0" err="1" smtClean="0"/>
-              <a:t>gen</a:t>
-            </a:r>
-            <a:r>
-              <a:rPr lang="en-US" dirty="0" err="1" smtClean="0"/>
-              <a:t>éticos</a:t>
+              <a:t>genéticos</a:t>
             </a:r>
             <a:r>
               <a:rPr lang="en-US" dirty="0" smtClean="0"/>
@@ -3480,7 +3468,12 @@
             <p:ph type="body" sz="quarter" idx="11"/>
           </p:nvPr>
         </p:nvSpPr>
-        <p:spPr/>
+        <p:spPr>
+          <a:xfrm>
+            <a:off x="683568" y="1412776"/>
+            <a:ext cx="7920037" cy="1224136"/>
+          </a:xfrm>
+        </p:spPr>
         <p:txBody>
           <a:bodyPr/>
           <a:lstStyle/>
@@ -3489,27 +3482,10 @@
               <a:buNone/>
             </a:pPr>
             <a:r>
-              <a:rPr lang="en-US" smtClean="0"/>
-              <a:t>Explicar en términos generales los aspectos del problema que se quiere resolver con la aplicación.</a:t>
-            </a:r>
-          </a:p>
-          <a:p>
-            <a:pPr>
-              <a:buNone/>
-            </a:pPr>
-            <a:endParaRPr lang="en-US" smtClean="0"/>
-          </a:p>
-          <a:p>
-            <a:pPr>
-              <a:buNone/>
-            </a:pPr>
-            <a:r>
-              <a:rPr lang="en-US" smtClean="0"/>
-              <a:t>Usar una sola transparencia.</a:t>
-            </a:r>
-          </a:p>
-          <a:p>
-            <a:endParaRPr lang="en-US"/>
+              <a:rPr lang="es-ES_tradnl" dirty="0"/>
+              <a:t>Se pretende crear un algoritmo que sea capaz de predecir, con cierta precisión, el futuro cercano del mercado de valores en base a las condiciones actuales, basándose en experiencias anteriores.</a:t>
+            </a:r>
+            <a:endParaRPr lang="en-US" dirty="0"/>
           </a:p>
         </p:txBody>
       </p:sp>
@@ -3545,6 +3521,36 @@
           </a:p>
         </p:txBody>
       </p:sp>
+      <p:pic>
+        <p:nvPicPr>
+          <p:cNvPr id="5" name="Imagen 4" descr="horarios1.jpg"/>
+          <p:cNvPicPr>
+            <a:picLocks noChangeAspect="1"/>
+          </p:cNvPicPr>
+          <p:nvPr/>
+        </p:nvPicPr>
+        <p:blipFill>
+          <a:blip r:embed="rId2">
+            <a:extLst>
+              <a:ext uri="{28A0092B-C50C-407E-A947-70E740481C1C}">
+                <a14:useLocalDpi xmlns:a14="http://schemas.microsoft.com/office/drawing/2010/main" val="0"/>
+              </a:ext>
+            </a:extLst>
+          </a:blip>
+          <a:stretch>
+            <a:fillRect/>
+          </a:stretch>
+        </p:blipFill>
+        <p:spPr>
+          <a:xfrm>
+            <a:off x="2123728" y="2780928"/>
+            <a:ext cx="4752483" cy="2819270"/>
+          </a:xfrm>
+          <a:prstGeom prst="rect">
+            <a:avLst/>
+          </a:prstGeom>
+        </p:spPr>
+      </p:pic>
     </p:spTree>
   </p:cSld>
   <p:clrMapOvr>
@@ -3662,81 +3668,140 @@
             <p:ph type="body" sz="quarter" idx="11"/>
           </p:nvPr>
         </p:nvSpPr>
-        <p:spPr/>
+        <p:spPr>
+          <a:xfrm>
+            <a:off x="684213" y="980728"/>
+            <a:ext cx="7920037" cy="2376264"/>
+          </a:xfrm>
+        </p:spPr>
         <p:txBody>
           <a:bodyPr/>
           <a:lstStyle/>
           <a:p>
-            <a:r>
-              <a:rPr lang="en-US" smtClean="0"/>
-              <a:t>Justificar que el problema es relevante en términos de  </a:t>
-            </a:r>
-          </a:p>
-          <a:p>
-            <a:pPr lvl="1"/>
-            <a:r>
-              <a:rPr lang="en-US" smtClean="0"/>
-              <a:t>beneficios para los usuarios, </a:t>
-            </a:r>
-          </a:p>
-          <a:p>
-            <a:pPr lvl="1"/>
-            <a:r>
-              <a:rPr lang="en-US" smtClean="0"/>
-              <a:t>beneficios económicos</a:t>
-            </a:r>
-          </a:p>
-          <a:p>
-            <a:pPr lvl="1"/>
-            <a:r>
-              <a:rPr lang="en-US" smtClean="0"/>
-              <a:t>mejora de la vida de las personas,</a:t>
-            </a:r>
-          </a:p>
-          <a:p>
-            <a:pPr lvl="1"/>
-            <a:r>
-              <a:rPr lang="en-US" smtClean="0"/>
-              <a:t>mejora de actividades profesionales o científicas, </a:t>
-            </a:r>
-          </a:p>
-          <a:p>
-            <a:pPr lvl="1"/>
-            <a:r>
-              <a:rPr lang="en-US" smtClean="0"/>
-              <a:t>mejora del rendimiento de sistemas informáticos, industria, servicios,...</a:t>
-            </a:r>
-          </a:p>
-          <a:p>
-            <a:pPr lvl="1"/>
-            <a:r>
-              <a:rPr lang="en-US" smtClean="0"/>
-              <a:t>...</a:t>
-            </a:r>
-          </a:p>
-          <a:p>
-            <a:pPr lvl="1"/>
-            <a:endParaRPr lang="en-US" smtClean="0"/>
-          </a:p>
-          <a:p>
-            <a:pPr lvl="1">
+            <a:pPr marL="457200" lvl="1" indent="0">
               <a:buNone/>
             </a:pPr>
             <a:r>
-              <a:rPr lang="en-US" smtClean="0"/>
-              <a:t>Usar una sola  transparencia</a:t>
-            </a:r>
+              <a:rPr lang="en-US" dirty="0" err="1" smtClean="0"/>
+              <a:t>Beneficios</a:t>
+            </a:r>
+            <a:r>
+              <a:rPr lang="en-US" dirty="0" smtClean="0"/>
+              <a:t> </a:t>
+            </a:r>
+            <a:r>
+              <a:rPr lang="en-US" dirty="0" err="1" smtClean="0"/>
+              <a:t>econ</a:t>
+            </a:r>
+            <a:r>
+              <a:rPr lang="en-US" dirty="0" err="1" smtClean="0"/>
+              <a:t>ómicos</a:t>
+            </a:r>
+            <a:r>
+              <a:rPr lang="en-US" dirty="0" smtClean="0"/>
+              <a:t> y </a:t>
+            </a:r>
+            <a:r>
+              <a:rPr lang="en-US" dirty="0" err="1" smtClean="0"/>
+              <a:t>para</a:t>
+            </a:r>
+            <a:r>
+              <a:rPr lang="en-US" dirty="0" smtClean="0"/>
+              <a:t> los </a:t>
+            </a:r>
+            <a:r>
+              <a:rPr lang="en-US" dirty="0" err="1" smtClean="0"/>
+              <a:t>usuarios</a:t>
+            </a:r>
+            <a:r>
+              <a:rPr lang="en-US" dirty="0" smtClean="0"/>
+              <a:t>:</a:t>
+            </a:r>
+          </a:p>
+          <a:p>
+            <a:pPr marL="457200" lvl="1" indent="0">
+              <a:buNone/>
+            </a:pPr>
+            <a:endParaRPr lang="en-US" dirty="0" smtClean="0"/>
           </a:p>
           <a:p>
             <a:pPr lvl="1"/>
-            <a:endParaRPr lang="en-US" smtClean="0"/>
+            <a:r>
+              <a:rPr lang="es-ES_tradnl" dirty="0"/>
+              <a:t>Intercambiar valores </a:t>
+            </a:r>
+            <a:r>
+              <a:rPr lang="es-ES_tradnl" dirty="0" smtClean="0"/>
+              <a:t>financieros tales </a:t>
+            </a:r>
+            <a:r>
+              <a:rPr lang="es-ES_tradnl" dirty="0"/>
+              <a:t>como activos u </a:t>
+            </a:r>
+            <a:r>
+              <a:rPr lang="es-ES_tradnl" dirty="0" smtClean="0"/>
+              <a:t>opciones.</a:t>
+            </a:r>
+            <a:endParaRPr lang="es-ES_tradnl" dirty="0"/>
           </a:p>
           <a:p>
             <a:pPr lvl="1"/>
-            <a:endParaRPr lang="en-US" smtClean="0"/>
-          </a:p>
-          <a:p>
-            <a:endParaRPr lang="en-US"/>
+            <a:r>
+              <a:rPr lang="es-ES_tradnl" dirty="0"/>
+              <a:t>Conseguir información </a:t>
+            </a:r>
+            <a:r>
+              <a:rPr lang="es-ES_tradnl" dirty="0" smtClean="0"/>
+              <a:t>del mercado.</a:t>
+            </a:r>
+            <a:endParaRPr lang="es-ES_tradnl" dirty="0"/>
+          </a:p>
+          <a:p>
+            <a:pPr lvl="1"/>
+            <a:r>
+              <a:rPr lang="es-ES_tradnl" dirty="0" smtClean="0"/>
+              <a:t>Ganar dinero.</a:t>
+            </a:r>
+            <a:endParaRPr lang="es-ES_tradnl" dirty="0"/>
+          </a:p>
+          <a:p>
+            <a:pPr lvl="1"/>
+            <a:r>
+              <a:rPr lang="es-ES_tradnl" dirty="0"/>
+              <a:t>Internacionalizar el </a:t>
+            </a:r>
+            <a:r>
+              <a:rPr lang="es-ES_tradnl" dirty="0" smtClean="0"/>
+              <a:t>liderazgo de </a:t>
+            </a:r>
+            <a:r>
+              <a:rPr lang="es-ES_tradnl" dirty="0"/>
+              <a:t>las empresas para </a:t>
+            </a:r>
+            <a:r>
+              <a:rPr lang="es-ES_tradnl" dirty="0" smtClean="0"/>
+              <a:t>que estás</a:t>
+            </a:r>
+            <a:r>
+              <a:rPr lang="es-ES_tradnl" dirty="0"/>
+              <a:t>, puedan ganar </a:t>
+            </a:r>
+            <a:r>
+              <a:rPr lang="es-ES_tradnl" dirty="0" smtClean="0"/>
+              <a:t>capital para </a:t>
+            </a:r>
+            <a:r>
+              <a:rPr lang="es-ES_tradnl" dirty="0"/>
+              <a:t>invertirlo en </a:t>
+            </a:r>
+            <a:r>
+              <a:rPr lang="es-ES_tradnl" dirty="0" smtClean="0"/>
+              <a:t>proyectos.</a:t>
+            </a:r>
+            <a:endParaRPr lang="en-US" dirty="0" smtClean="0"/>
+          </a:p>
+          <a:p>
+            <a:endParaRPr lang="en-US" dirty="0"/>
           </a:p>
         </p:txBody>
       </p:sp>
@@ -3863,76 +3928,144 @@
           <a:bodyPr/>
           <a:lstStyle/>
           <a:p>
-            <a:pPr lvl="0"/>
-            <a:r>
-              <a:rPr lang="en-US" smtClean="0"/>
-              <a:t>Tratar de identificar los requisitos más importantes de la aplicación.</a:t>
-            </a:r>
-          </a:p>
-          <a:p>
-            <a:pPr lvl="0"/>
-            <a:r>
-              <a:rPr lang="en-US" smtClean="0"/>
-              <a:t>Explicar por qué se requiere el uso de técnicas de IA (usando uno o varios argumentos) por ejemplo :</a:t>
-            </a:r>
-          </a:p>
-          <a:p>
-            <a:pPr lvl="1"/>
-            <a:r>
-              <a:rPr lang="en-US" smtClean="0"/>
-              <a:t>No puede resolverse con técnicas convencionales</a:t>
-            </a:r>
-          </a:p>
-          <a:p>
-            <a:pPr lvl="2"/>
-            <a:r>
-              <a:rPr lang="en-US" smtClean="0"/>
-              <a:t>Conocimiento poco estructurado o muy distribuido</a:t>
-            </a:r>
-          </a:p>
-          <a:p>
-            <a:pPr lvl="2"/>
-            <a:r>
-              <a:rPr lang="en-US" smtClean="0"/>
-              <a:t>Complejidad computacional (en tiempo y espacio)</a:t>
-            </a:r>
-          </a:p>
-          <a:p>
-            <a:pPr lvl="2"/>
-            <a:r>
-              <a:rPr lang="en-US" smtClean="0"/>
-              <a:t>...</a:t>
-            </a:r>
-          </a:p>
-          <a:p>
-            <a:pPr lvl="1"/>
-            <a:r>
-              <a:rPr lang="en-US" smtClean="0"/>
-              <a:t>Exige emular funciones cognitivas humanas</a:t>
-            </a:r>
-          </a:p>
-          <a:p>
-            <a:pPr lvl="1"/>
-            <a:r>
-              <a:rPr lang="en-US" smtClean="0"/>
-              <a:t>...</a:t>
-            </a:r>
-          </a:p>
-          <a:p>
-            <a:pPr lvl="1"/>
-            <a:endParaRPr lang="en-US" smtClean="0"/>
-          </a:p>
-          <a:p>
-            <a:pPr lvl="1">
+            <a:pPr marL="0" indent="0">
               <a:buNone/>
             </a:pPr>
             <a:r>
-              <a:rPr lang="en-US" smtClean="0"/>
-              <a:t>Usar una sola transparencia.</a:t>
-            </a:r>
-          </a:p>
-          <a:p>
-            <a:endParaRPr lang="en-US"/>
+              <a:rPr lang="es-ES_tradnl" dirty="0"/>
+              <a:t>Ventajas de un programa informático sobre los </a:t>
+            </a:r>
+            <a:r>
+              <a:rPr lang="es-ES_tradnl" dirty="0" smtClean="0"/>
+              <a:t>humanos</a:t>
+            </a:r>
+            <a:endParaRPr lang="es-ES_tradnl" dirty="0"/>
+          </a:p>
+          <a:p>
+            <a:pPr marL="0" indent="0">
+              <a:buNone/>
+            </a:pPr>
+            <a:r>
+              <a:rPr lang="es-ES_tradnl" dirty="0" smtClean="0"/>
+              <a:t>	</a:t>
+            </a:r>
+          </a:p>
+          <a:p>
+            <a:pPr marL="0" indent="0">
+              <a:buNone/>
+            </a:pPr>
+            <a:r>
+              <a:rPr lang="es-ES_tradnl" dirty="0"/>
+              <a:t>	</a:t>
+            </a:r>
+            <a:r>
+              <a:rPr lang="es-ES_tradnl" dirty="0" smtClean="0"/>
+              <a:t>- </a:t>
+            </a:r>
+            <a:r>
+              <a:rPr lang="es-ES_tradnl" dirty="0"/>
+              <a:t>Más rápido -&gt; se adelanta a </a:t>
+            </a:r>
+            <a:r>
+              <a:rPr lang="es-ES_tradnl" dirty="0" smtClean="0"/>
+              <a:t>ellos </a:t>
+            </a:r>
+            <a:r>
+              <a:rPr lang="es-ES_tradnl" dirty="0"/>
+              <a:t>-&gt; mayor </a:t>
+            </a:r>
+            <a:r>
+              <a:rPr lang="es-ES_tradnl" dirty="0" smtClean="0"/>
+              <a:t>volumen.</a:t>
+            </a:r>
+            <a:endParaRPr lang="es-ES_tradnl" dirty="0"/>
+          </a:p>
+          <a:p>
+            <a:pPr marL="0" indent="0">
+              <a:buNone/>
+            </a:pPr>
+            <a:r>
+              <a:rPr lang="es-ES_tradnl" dirty="0" smtClean="0"/>
+              <a:t>	- </a:t>
+            </a:r>
+            <a:r>
+              <a:rPr lang="es-ES_tradnl" dirty="0"/>
+              <a:t>Menor </a:t>
+            </a:r>
+            <a:r>
+              <a:rPr lang="es-ES_tradnl" dirty="0" smtClean="0"/>
+              <a:t>coste.</a:t>
+            </a:r>
+            <a:endParaRPr lang="es-ES_tradnl" dirty="0"/>
+          </a:p>
+          <a:p>
+            <a:endParaRPr lang="es-ES_tradnl" dirty="0"/>
+          </a:p>
+          <a:p>
+            <a:pPr marL="0" indent="0">
+              <a:buNone/>
+            </a:pPr>
+            <a:r>
+              <a:rPr lang="es-ES_tradnl" dirty="0"/>
+              <a:t>¿Por qué IA y no técnicas convencionales?</a:t>
+            </a:r>
+          </a:p>
+          <a:p>
+            <a:endParaRPr lang="es-ES_tradnl" dirty="0"/>
+          </a:p>
+          <a:p>
+            <a:pPr marL="0" indent="0">
+              <a:buNone/>
+            </a:pPr>
+            <a:r>
+              <a:rPr lang="es-ES_tradnl" dirty="0" smtClean="0"/>
+              <a:t>	- </a:t>
+            </a:r>
+            <a:r>
+              <a:rPr lang="es-ES_tradnl" dirty="0"/>
+              <a:t>Menos esfuerzo computacional -&gt; puede tener en cuenta más </a:t>
+            </a:r>
+            <a:r>
+              <a:rPr lang="es-ES_tradnl" dirty="0" smtClean="0"/>
+              <a:t>datos.</a:t>
+            </a:r>
+            <a:endParaRPr lang="es-ES_tradnl" dirty="0"/>
+          </a:p>
+          <a:p>
+            <a:pPr marL="0" indent="0">
+              <a:buNone/>
+            </a:pPr>
+            <a:r>
+              <a:rPr lang="es-ES_tradnl" dirty="0" smtClean="0"/>
+              <a:t>	- </a:t>
+            </a:r>
+            <a:r>
+              <a:rPr lang="es-ES_tradnl" dirty="0"/>
+              <a:t>No es necesario conocer en profundidad el </a:t>
+            </a:r>
+            <a:r>
+              <a:rPr lang="es-ES_tradnl" dirty="0" smtClean="0"/>
+              <a:t>problema.</a:t>
+            </a:r>
+            <a:endParaRPr lang="es-ES_tradnl" dirty="0"/>
+          </a:p>
+          <a:p>
+            <a:pPr marL="0" indent="0">
+              <a:buNone/>
+            </a:pPr>
+            <a:r>
+              <a:rPr lang="es-ES_tradnl" dirty="0" smtClean="0"/>
+              <a:t>	- </a:t>
+            </a:r>
+            <a:r>
+              <a:rPr lang="es-ES_tradnl" dirty="0"/>
+              <a:t>Se adapta a entornos </a:t>
+            </a:r>
+            <a:r>
+              <a:rPr lang="es-ES_tradnl" dirty="0" smtClean="0"/>
+              <a:t>cambiantes.</a:t>
+            </a:r>
+            <a:endParaRPr lang="en-US" dirty="0"/>
           </a:p>
         </p:txBody>
       </p:sp>
@@ -4258,59 +4391,10 @@
           <a:bodyPr/>
           <a:lstStyle/>
           <a:p>
-            <a:r>
-              <a:rPr lang="en-US" smtClean="0"/>
-              <a:t>Explicar cómo funciona la aplicación en términos de</a:t>
-            </a:r>
-          </a:p>
-          <a:p>
-            <a:pPr lvl="1"/>
-            <a:r>
-              <a:rPr lang="en-US" smtClean="0"/>
-              <a:t>información de entrada requerida</a:t>
-            </a:r>
-          </a:p>
-          <a:p>
-            <a:pPr lvl="1"/>
-            <a:r>
-              <a:rPr lang="en-US" smtClean="0"/>
-              <a:t>interacción o no con humanos</a:t>
-            </a:r>
-          </a:p>
-          <a:p>
-            <a:pPr lvl="1"/>
-            <a:r>
-              <a:rPr lang="en-US" smtClean="0"/>
-              <a:t>proceso interno</a:t>
-            </a:r>
-          </a:p>
-          <a:p>
-            <a:pPr lvl="1"/>
-            <a:r>
-              <a:rPr lang="en-US" smtClean="0"/>
-              <a:t>información de salida</a:t>
-            </a:r>
-          </a:p>
-          <a:p>
-            <a:r>
-              <a:rPr lang="en-US" smtClean="0"/>
-              <a:t>Apoyarse en un esquema gráfico si es posible</a:t>
-            </a:r>
-          </a:p>
-          <a:p>
-            <a:endParaRPr lang="en-US" smtClean="0"/>
-          </a:p>
-          <a:p>
-            <a:pPr>
+            <a:pPr marL="0" indent="0">
               <a:buNone/>
             </a:pPr>
-            <a:r>
-              <a:rPr lang="en-US" smtClean="0"/>
-              <a:t>Usar 3 transparencias como máximo.</a:t>
-            </a:r>
-          </a:p>
-          <a:p>
-            <a:endParaRPr lang="en-US"/>
+            <a:endParaRPr lang="en-US" dirty="0"/>
           </a:p>
         </p:txBody>
       </p:sp>

</xml_diff>

<commit_message>
Añadida parte de rafa
Faltan las transparencias rafa!!!
</commit_message>
<xml_diff>
--- a/Practica1/PresentacionlA.pptx
+++ b/Practica1/PresentacionlA.pptx
@@ -5,7 +5,7 @@
     <p:sldMasterId id="2147483900" r:id="rId1"/>
   </p:sldMasterIdLst>
   <p:notesMasterIdLst>
-    <p:notesMasterId r:id="rId10"/>
+    <p:notesMasterId r:id="rId12"/>
   </p:notesMasterIdLst>
   <p:sldIdLst>
     <p:sldId id="256" r:id="rId2"/>
@@ -15,7 +15,9 @@
     <p:sldId id="265" r:id="rId6"/>
     <p:sldId id="260" r:id="rId7"/>
     <p:sldId id="262" r:id="rId8"/>
-    <p:sldId id="264" r:id="rId9"/>
+    <p:sldId id="266" r:id="rId9"/>
+    <p:sldId id="267" r:id="rId10"/>
+    <p:sldId id="264" r:id="rId11"/>
   </p:sldIdLst>
   <p:sldSz cx="9144000" cy="6858000" type="screen4x3"/>
   <p:notesSz cx="6858000" cy="9144000"/>
@@ -200,7 +202,7 @@
             <a:fld id="{BF26D1C3-BD64-4F4C-B674-447300629CDA}" type="datetimeFigureOut">
               <a:rPr lang="es-ES" smtClean="0"/>
               <a:pPr/>
-              <a:t>05/03/15</a:t>
+              <a:t>06/03/15</a:t>
             </a:fld>
             <a:endParaRPr lang="en-US"/>
           </a:p>
@@ -2047,7 +2049,7 @@
             <a:fld id="{025A5881-F1B6-40FD-811F-146D742BC070}" type="datetime1">
               <a:rPr lang="es-ES" smtClean="0"/>
               <a:pPr/>
-              <a:t>05/03/15</a:t>
+              <a:t>06/03/15</a:t>
             </a:fld>
             <a:endParaRPr lang="en-US"/>
           </a:p>
@@ -3218,6 +3220,409 @@
 </p:sld>
 </file>
 
+<file path=ppt/slides/slide10.xml><?xml version="1.0" encoding="utf-8"?>
+<p:sld xmlns:a="http://schemas.openxmlformats.org/drawingml/2006/main" xmlns:r="http://schemas.openxmlformats.org/officeDocument/2006/relationships" xmlns:p="http://schemas.openxmlformats.org/presentationml/2006/main">
+  <p:cSld>
+    <p:spTree>
+      <p:nvGrpSpPr>
+        <p:cNvPr id="1" name=""/>
+        <p:cNvGrpSpPr/>
+        <p:nvPr/>
+      </p:nvGrpSpPr>
+      <p:grpSpPr>
+        <a:xfrm>
+          <a:off x="0" y="0"/>
+          <a:ext cx="0" cy="0"/>
+          <a:chOff x="0" y="0"/>
+          <a:chExt cx="0" cy="0"/>
+        </a:xfrm>
+      </p:grpSpPr>
+      <p:sp>
+        <p:nvSpPr>
+          <p:cNvPr id="2" name="1 Título"/>
+          <p:cNvSpPr>
+            <a:spLocks noGrp="1"/>
+          </p:cNvSpPr>
+          <p:nvPr>
+            <p:ph type="title"/>
+          </p:nvPr>
+        </p:nvSpPr>
+        <p:spPr/>
+        <p:txBody>
+          <a:bodyPr/>
+          <a:lstStyle/>
+          <a:p>
+            <a:r>
+              <a:rPr lang="en-US" smtClean="0"/>
+              <a:t>5. Referencias</a:t>
+            </a:r>
+            <a:endParaRPr lang="en-US"/>
+          </a:p>
+        </p:txBody>
+      </p:sp>
+      <p:sp>
+        <p:nvSpPr>
+          <p:cNvPr id="3" name="2 Marcador de contenido"/>
+          <p:cNvSpPr>
+            <a:spLocks noGrp="1"/>
+          </p:cNvSpPr>
+          <p:nvPr>
+            <p:ph idx="10"/>
+          </p:nvPr>
+        </p:nvSpPr>
+        <p:spPr>
+          <a:xfrm>
+            <a:off x="755650" y="300038"/>
+            <a:ext cx="8232775" cy="214312"/>
+          </a:xfrm>
+        </p:spPr>
+        <p:txBody>
+          <a:bodyPr/>
+          <a:lstStyle/>
+          <a:p>
+            <a:r>
+              <a:rPr lang="en-US" dirty="0" err="1"/>
+              <a:t>Algoritmos</a:t>
+            </a:r>
+            <a:r>
+              <a:rPr lang="en-US" dirty="0"/>
+              <a:t> </a:t>
+            </a:r>
+            <a:r>
+              <a:rPr lang="en-US" dirty="0" err="1"/>
+              <a:t>genéticos</a:t>
+            </a:r>
+            <a:r>
+              <a:rPr lang="en-US" dirty="0"/>
+              <a:t> en el </a:t>
+            </a:r>
+            <a:r>
+              <a:rPr lang="en-US" dirty="0" err="1"/>
+              <a:t>mercado</a:t>
+            </a:r>
+            <a:r>
+              <a:rPr lang="en-US" dirty="0"/>
+              <a:t> </a:t>
+            </a:r>
+            <a:r>
+              <a:rPr lang="en-US" dirty="0" err="1"/>
+              <a:t>financiero</a:t>
+            </a:r>
+            <a:endParaRPr lang="en-US" dirty="0"/>
+          </a:p>
+        </p:txBody>
+      </p:sp>
+      <p:sp>
+        <p:nvSpPr>
+          <p:cNvPr id="7" name="6 Marcador de texto"/>
+          <p:cNvSpPr>
+            <a:spLocks noGrp="1"/>
+          </p:cNvSpPr>
+          <p:nvPr>
+            <p:ph type="body" sz="quarter" idx="11"/>
+          </p:nvPr>
+        </p:nvSpPr>
+        <p:spPr/>
+        <p:txBody>
+          <a:bodyPr/>
+          <a:lstStyle/>
+          <a:p>
+            <a:pPr marL="457200" lvl="1" indent="0">
+              <a:spcBef>
+                <a:spcPts val="0"/>
+              </a:spcBef>
+              <a:buNone/>
+            </a:pPr>
+            <a:endParaRPr lang="en-US" sz="1200" dirty="0" smtClean="0"/>
+          </a:p>
+          <a:p>
+            <a:r>
+              <a:rPr lang="en-US" sz="1200" dirty="0" err="1" smtClean="0"/>
+              <a:t>Página</a:t>
+            </a:r>
+            <a:r>
+              <a:rPr lang="en-US" sz="1200" dirty="0" smtClean="0"/>
+              <a:t> web </a:t>
+            </a:r>
+            <a:r>
+              <a:rPr lang="en-US" sz="1200" dirty="0" err="1" smtClean="0"/>
+              <a:t>consultadas</a:t>
+            </a:r>
+            <a:r>
+              <a:rPr lang="en-US" sz="1200" dirty="0" smtClean="0"/>
+              <a:t>:</a:t>
+            </a:r>
+            <a:endParaRPr lang="en-US" sz="1200" dirty="0"/>
+          </a:p>
+          <a:p>
+            <a:pPr lvl="1"/>
+            <a:r>
+              <a:rPr lang="en-US" sz="1200" dirty="0" smtClean="0"/>
+              <a:t>Wikipedia. </a:t>
+            </a:r>
+            <a:r>
+              <a:rPr lang="es-ES_tradnl" sz="1200" dirty="0">
+                <a:hlinkClick r:id="rId2"/>
+              </a:rPr>
+              <a:t>http://es.wikipedia.org/wiki/</a:t>
+            </a:r>
+            <a:r>
+              <a:rPr lang="es-ES_tradnl" sz="1200" dirty="0" smtClean="0">
+                <a:hlinkClick r:id="rId2"/>
+              </a:rPr>
+              <a:t>Algoritmo_genético</a:t>
+            </a:r>
+            <a:endParaRPr lang="es-ES_tradnl" sz="1200" dirty="0" smtClean="0"/>
+          </a:p>
+          <a:p>
+            <a:pPr lvl="1"/>
+            <a:r>
+              <a:rPr lang="es-ES_tradnl" sz="1200" dirty="0"/>
+              <a:t>Wikipedia. </a:t>
+            </a:r>
+            <a:r>
+              <a:rPr lang="es-ES_tradnl" sz="1200" dirty="0">
+                <a:hlinkClick r:id="rId3"/>
+              </a:rPr>
+              <a:t>http://es.wikipedia.org/wiki/</a:t>
+            </a:r>
+            <a:r>
+              <a:rPr lang="es-ES_tradnl" sz="1200" dirty="0" smtClean="0">
+                <a:hlinkClick r:id="rId3"/>
+              </a:rPr>
+              <a:t>Mercado_financiero</a:t>
+            </a:r>
+            <a:endParaRPr lang="es-ES_tradnl" sz="1200" dirty="0" smtClean="0"/>
+          </a:p>
+          <a:p>
+            <a:pPr lvl="1"/>
+            <a:r>
+              <a:rPr lang="es-ES_tradnl" sz="1200" dirty="0"/>
+              <a:t>Wikipedia. </a:t>
+            </a:r>
+            <a:r>
+              <a:rPr lang="es-ES_tradnl" sz="1200" dirty="0">
+                <a:hlinkClick r:id="rId4"/>
+              </a:rPr>
+              <a:t>http://es.wikipedia.org/wiki/</a:t>
+            </a:r>
+            <a:r>
+              <a:rPr lang="es-ES_tradnl" sz="1200" dirty="0" smtClean="0">
+                <a:hlinkClick r:id="rId4"/>
+              </a:rPr>
+              <a:t>Programación_genética</a:t>
+            </a:r>
+            <a:endParaRPr lang="es-ES_tradnl" sz="1200" dirty="0" smtClean="0"/>
+          </a:p>
+          <a:p>
+            <a:r>
+              <a:rPr lang="es-ES_tradnl" sz="1200" dirty="0" smtClean="0"/>
+              <a:t>Art</a:t>
+            </a:r>
+            <a:r>
+              <a:rPr lang="es-ES_tradnl" sz="1200" dirty="0" smtClean="0"/>
+              <a:t>ículos Consultados:</a:t>
+            </a:r>
+          </a:p>
+          <a:p>
+            <a:pPr lvl="1"/>
+            <a:r>
+              <a:rPr lang="es-ES_tradnl" sz="1200" dirty="0" smtClean="0"/>
+              <a:t>Algoritmos Gen</a:t>
+            </a:r>
+            <a:r>
+              <a:rPr lang="es-ES_tradnl" sz="1200" dirty="0" smtClean="0"/>
+              <a:t>éticos: </a:t>
+            </a:r>
+            <a:r>
+              <a:rPr lang="es-ES_tradnl" sz="1200" dirty="0" smtClean="0">
+                <a:hlinkClick r:id="rId5"/>
+              </a:rPr>
+              <a:t>http</a:t>
+            </a:r>
+            <a:r>
+              <a:rPr lang="es-ES_tradnl" sz="1200" dirty="0">
+                <a:hlinkClick r:id="rId5"/>
+              </a:rPr>
+              <a:t>://www.sc.ehu.es/ccwbayes/docencia/mmcc/docs/</a:t>
+            </a:r>
+            <a:r>
+              <a:rPr lang="es-ES_tradnl" sz="1200" dirty="0" smtClean="0">
+                <a:hlinkClick r:id="rId5"/>
+              </a:rPr>
+              <a:t>temageneticos.pdf</a:t>
+            </a:r>
+            <a:endParaRPr lang="es-ES_tradnl" sz="1200" dirty="0" smtClean="0"/>
+          </a:p>
+          <a:p>
+            <a:pPr lvl="1"/>
+            <a:r>
+              <a:rPr lang="fi-FI" sz="1200" dirty="0">
+                <a:hlinkClick r:id="rId6"/>
+              </a:rPr>
+              <a:t>http://geneura.ugr.es/~jmerelo/ie/</a:t>
+            </a:r>
+            <a:r>
+              <a:rPr lang="fi-FI" sz="1200" dirty="0" smtClean="0">
+                <a:hlinkClick r:id="rId6"/>
+              </a:rPr>
+              <a:t>ags.htm</a:t>
+            </a:r>
+            <a:endParaRPr lang="fi-FI" sz="1200" dirty="0" smtClean="0"/>
+          </a:p>
+          <a:p>
+            <a:pPr lvl="1"/>
+            <a:r>
+              <a:rPr lang="es-ES_tradnl" sz="1200" dirty="0" err="1">
+                <a:effectLst/>
+              </a:rPr>
+              <a:t>Programación</a:t>
+            </a:r>
+            <a:r>
+              <a:rPr lang="es-ES_tradnl" sz="1200" dirty="0">
+                <a:effectLst/>
+              </a:rPr>
+              <a:t> </a:t>
+            </a:r>
+            <a:r>
+              <a:rPr lang="es-ES_tradnl" sz="1200" dirty="0" err="1">
+                <a:effectLst/>
+              </a:rPr>
+              <a:t>genética</a:t>
+            </a:r>
+            <a:r>
+              <a:rPr lang="es-ES_tradnl" sz="1200" dirty="0">
+                <a:effectLst/>
+              </a:rPr>
+              <a:t> en mercados </a:t>
+            </a:r>
+            <a:r>
+              <a:rPr lang="es-ES_tradnl" sz="1200" dirty="0" smtClean="0">
+                <a:effectLst/>
+              </a:rPr>
+              <a:t>financieros, FIB, UPC</a:t>
+            </a:r>
+            <a:r>
+              <a:rPr lang="es-ES_tradnl" sz="1200" dirty="0" smtClean="0"/>
+              <a:t>: </a:t>
+            </a:r>
+            <a:r>
+              <a:rPr lang="en-US" sz="1200" dirty="0" smtClean="0">
+                <a:hlinkClick r:id="rId7"/>
+              </a:rPr>
+              <a:t>http</a:t>
+            </a:r>
+            <a:r>
+              <a:rPr lang="en-US" sz="1200" dirty="0">
+                <a:hlinkClick r:id="rId7"/>
+              </a:rPr>
+              <a:t>://upcommons.upc.edu/pfc/bitstream/2099.1/14104/1/77634.</a:t>
+            </a:r>
+            <a:r>
+              <a:rPr lang="en-US" sz="1200" dirty="0" smtClean="0">
+                <a:hlinkClick r:id="rId7"/>
+              </a:rPr>
+              <a:t>pdf</a:t>
+            </a:r>
+            <a:endParaRPr lang="en-US" sz="1200" dirty="0" smtClean="0"/>
+          </a:p>
+          <a:p>
+            <a:pPr lvl="1"/>
+            <a:r>
+              <a:rPr lang="en-US" sz="1200" dirty="0" err="1" smtClean="0"/>
+              <a:t>Algoritmos</a:t>
+            </a:r>
+            <a:r>
+              <a:rPr lang="en-US" sz="1200" dirty="0" smtClean="0"/>
+              <a:t> </a:t>
+            </a:r>
+            <a:r>
+              <a:rPr lang="en-US" sz="1200" dirty="0" err="1" smtClean="0"/>
+              <a:t>Gen</a:t>
+            </a:r>
+            <a:r>
+              <a:rPr lang="en-US" sz="1200" dirty="0" err="1" smtClean="0"/>
+              <a:t>éticos</a:t>
+            </a:r>
+            <a:r>
+              <a:rPr lang="en-US" sz="1200" dirty="0" smtClean="0"/>
+              <a:t>, Andrés Herrera </a:t>
+            </a:r>
+            <a:r>
+              <a:rPr lang="en-US" sz="1200" dirty="0" err="1" smtClean="0"/>
+              <a:t>Poyatos</a:t>
+            </a:r>
+            <a:r>
+              <a:rPr lang="en-US" sz="1200" dirty="0"/>
+              <a:t>.</a:t>
+            </a:r>
+            <a:endParaRPr lang="en-US" sz="1200" dirty="0" smtClean="0"/>
+          </a:p>
+          <a:p>
+            <a:pPr lvl="1"/>
+            <a:endParaRPr lang="es-ES_tradnl" sz="1200" dirty="0" smtClean="0"/>
+          </a:p>
+          <a:p>
+            <a:pPr lvl="1"/>
+            <a:endParaRPr lang="es-ES_tradnl" sz="1200" dirty="0" smtClean="0"/>
+          </a:p>
+          <a:p>
+            <a:pPr lvl="1"/>
+            <a:endParaRPr lang="es-ES_tradnl" sz="1200" dirty="0"/>
+          </a:p>
+          <a:p>
+            <a:pPr lvl="1"/>
+            <a:endParaRPr lang="en-US" sz="1200" dirty="0"/>
+          </a:p>
+        </p:txBody>
+      </p:sp>
+      <p:sp>
+        <p:nvSpPr>
+          <p:cNvPr id="4" name="3 Marcador de número de diapositiva"/>
+          <p:cNvSpPr>
+            <a:spLocks noGrp="1"/>
+          </p:cNvSpPr>
+          <p:nvPr>
+            <p:ph type="sldNum" sz="quarter" idx="4294967295"/>
+          </p:nvPr>
+        </p:nvSpPr>
+        <p:spPr>
+          <a:xfrm>
+            <a:off x="7010400" y="6356350"/>
+            <a:ext cx="2133600" cy="365125"/>
+          </a:xfrm>
+          <a:prstGeom prst="rect">
+            <a:avLst/>
+          </a:prstGeom>
+        </p:spPr>
+        <p:txBody>
+          <a:bodyPr/>
+          <a:lstStyle/>
+          <a:p>
+            <a:fld id="{3ECF9D19-8B94-437E-9A3D-4B8D46B69AB6}" type="slidenum">
+              <a:rPr lang="en-US" smtClean="0"/>
+              <a:pPr/>
+              <a:t>10</a:t>
+            </a:fld>
+            <a:endParaRPr lang="en-US"/>
+          </a:p>
+        </p:txBody>
+      </p:sp>
+    </p:spTree>
+  </p:cSld>
+  <p:clrMapOvr>
+    <a:masterClrMapping/>
+  </p:clrMapOvr>
+  <p:timing>
+    <p:tnLst>
+      <p:par>
+        <p:cTn xmlns:p14="http://schemas.microsoft.com/office/powerpoint/2010/main" id="1" dur="indefinite" restart="never" nodeType="tmRoot"/>
+      </p:par>
+    </p:tnLst>
+  </p:timing>
+</p:sld>
+</file>
+
 <file path=ppt/slides/slide2.xml><?xml version="1.0" encoding="utf-8"?>
 <p:sld xmlns:a="http://schemas.openxmlformats.org/drawingml/2006/main" xmlns:r="http://schemas.openxmlformats.org/officeDocument/2006/relationships" xmlns:p="http://schemas.openxmlformats.org/presentationml/2006/main">
   <p:cSld>
@@ -3315,37 +3720,104 @@
             <p:ph type="body" sz="quarter" idx="11"/>
           </p:nvPr>
         </p:nvSpPr>
-        <p:spPr/>
+        <p:spPr>
+          <a:xfrm>
+            <a:off x="684213" y="980728"/>
+            <a:ext cx="7920037" cy="2160240"/>
+          </a:xfrm>
+        </p:spPr>
         <p:txBody>
           <a:bodyPr/>
           <a:lstStyle/>
           <a:p>
             <a:r>
+              <a:rPr lang="es-ES_tradnl" dirty="0" smtClean="0"/>
+              <a:t>Descripci</a:t>
+            </a:r>
+            <a:r>
+              <a:rPr lang="es-ES_tradnl" dirty="0" smtClean="0"/>
+              <a:t>ón del problema.</a:t>
+            </a:r>
+          </a:p>
+          <a:p>
+            <a:r>
+              <a:rPr lang="es-ES_tradnl" dirty="0" smtClean="0"/>
+              <a:t>Objetivos </a:t>
+            </a:r>
+            <a:r>
+              <a:rPr lang="es-ES_tradnl" dirty="0"/>
+              <a:t>del problema </a:t>
+            </a:r>
+            <a:r>
+              <a:rPr lang="en-US" dirty="0"/>
+              <a:t>y </a:t>
+            </a:r>
+            <a:r>
+              <a:rPr lang="en-US" dirty="0" err="1"/>
+              <a:t>sus</a:t>
+            </a:r>
+            <a:r>
+              <a:rPr lang="en-US" dirty="0"/>
+              <a:t> </a:t>
+            </a:r>
+            <a:r>
+              <a:rPr lang="en-US" dirty="0" err="1" smtClean="0"/>
+              <a:t>beneficios</a:t>
+            </a:r>
+            <a:r>
               <a:rPr lang="en-US" dirty="0" smtClean="0"/>
-              <a:t>¿</a:t>
-            </a:r>
+              <a:t>.</a:t>
+            </a:r>
+            <a:endParaRPr lang="es-ES" dirty="0" smtClean="0"/>
+          </a:p>
+          <a:p>
             <a:r>
               <a:rPr lang="es-ES" dirty="0" smtClean="0"/>
-              <a:t>En qué consiste el problema? ¿Por qué es relevante?</a:t>
-            </a:r>
-          </a:p>
-          <a:p>
+              <a:t>Ventajas e aplicaci</a:t>
+            </a:r>
             <a:r>
               <a:rPr lang="es-ES" dirty="0" smtClean="0"/>
-              <a:t>¿Por qué requiere aplicar técnicas de IA?</a:t>
-            </a:r>
-          </a:p>
-          <a:p>
+              <a:t>ón de IA.</a:t>
+            </a:r>
+            <a:endParaRPr lang="es-ES" dirty="0" smtClean="0"/>
+          </a:p>
+          <a:p>
+            <a:r>
+              <a:rPr lang="es-ES" dirty="0"/>
+              <a:t>T</a:t>
+            </a:r>
             <a:r>
               <a:rPr lang="es-ES" dirty="0" smtClean="0"/>
-              <a:t>¿Qué técnicas de IA se aplican?</a:t>
-            </a:r>
-          </a:p>
-          <a:p>
+              <a:t>écnicas </a:t>
+            </a:r>
             <a:r>
               <a:rPr lang="es-ES" dirty="0" smtClean="0"/>
-              <a:t>¿Cómo funciona la aplicación?</a:t>
-            </a:r>
+              <a:t>de IA </a:t>
+            </a:r>
+            <a:r>
+              <a:rPr lang="es-ES" dirty="0" smtClean="0"/>
+              <a:t>aplicadas</a:t>
+            </a:r>
+            <a:r>
+              <a:rPr lang="es-ES" dirty="0"/>
+              <a:t>.</a:t>
+            </a:r>
+            <a:endParaRPr lang="es-ES" dirty="0" smtClean="0"/>
+          </a:p>
+          <a:p>
+            <a:r>
+              <a:rPr lang="es-ES" dirty="0" smtClean="0"/>
+              <a:t>Descripci</a:t>
+            </a:r>
+            <a:r>
+              <a:rPr lang="es-ES" dirty="0" smtClean="0"/>
+              <a:t>ón de la aplicación (</a:t>
+            </a:r>
+            <a:r>
+              <a:rPr lang="es-ES" dirty="0" smtClean="0"/>
+              <a:t>Funcionamiento interno).</a:t>
+            </a:r>
+            <a:endParaRPr lang="es-ES" dirty="0" smtClean="0"/>
           </a:p>
           <a:p>
             <a:r>
@@ -3470,8 +3942,8 @@
         </p:nvSpPr>
         <p:spPr>
           <a:xfrm>
-            <a:off x="683568" y="1412776"/>
-            <a:ext cx="7920037" cy="1224136"/>
+            <a:off x="683568" y="1484784"/>
+            <a:ext cx="7920037" cy="1008112"/>
           </a:xfrm>
         </p:spPr>
         <p:txBody>
@@ -3543,8 +4015,8 @@
         </p:blipFill>
         <p:spPr>
           <a:xfrm>
-            <a:off x="2123728" y="2780928"/>
-            <a:ext cx="4752483" cy="2819270"/>
+            <a:off x="2411760" y="2996952"/>
+            <a:ext cx="4320435" cy="2562970"/>
           </a:xfrm>
           <a:prstGeom prst="rect">
             <a:avLst/>
@@ -3596,17 +4068,36 @@
               <a:t>1.2 </a:t>
             </a:r>
             <a:r>
+              <a:rPr lang="es-ES_tradnl" dirty="0"/>
+              <a:t>Objetivos del problema</a:t>
+            </a:r>
+            <a:r>
+              <a:rPr lang="es-ES_tradnl" dirty="0"/>
+              <a:t> </a:t>
+            </a:r>
+            <a:r>
+              <a:rPr lang="en-US" dirty="0" smtClean="0"/>
+              <a:t>y </a:t>
+            </a:r>
+            <a:r>
               <a:rPr lang="en-US" dirty="0" err="1" smtClean="0"/>
-              <a:t>Relevancia</a:t>
+              <a:t>sus</a:t>
             </a:r>
             <a:r>
               <a:rPr lang="en-US" dirty="0" smtClean="0"/>
-              <a:t> del </a:t>
+              <a:t> </a:t>
             </a:r>
             <a:r>
               <a:rPr lang="en-US" dirty="0" err="1" smtClean="0"/>
-              <a:t>problema</a:t>
-            </a:r>
+              <a:t>beneficios</a:t>
+            </a:r>
+            <a:r>
+              <a:rPr lang="en-US" dirty="0" smtClean="0"/>
+              <a:t/>
+            </a:r>
+            <a:br>
+              <a:rPr lang="en-US" dirty="0" smtClean="0"/>
+            </a:br>
             <a:endParaRPr lang="en-US" dirty="0"/>
           </a:p>
         </p:txBody>
@@ -3682,39 +4173,35 @@
               <a:buNone/>
             </a:pPr>
             <a:r>
-              <a:rPr lang="en-US" dirty="0" err="1" smtClean="0"/>
+              <a:rPr lang="en-US" b="1" dirty="0" err="1" smtClean="0"/>
               <a:t>Beneficios</a:t>
             </a:r>
             <a:r>
-              <a:rPr lang="en-US" dirty="0" smtClean="0"/>
+              <a:rPr lang="en-US" b="1" dirty="0" smtClean="0"/>
               <a:t> </a:t>
             </a:r>
             <a:r>
-              <a:rPr lang="en-US" dirty="0" err="1" smtClean="0"/>
-              <a:t>econ</a:t>
-            </a:r>
-            <a:r>
-              <a:rPr lang="en-US" dirty="0" err="1" smtClean="0"/>
-              <a:t>ómicos</a:t>
-            </a:r>
-            <a:r>
-              <a:rPr lang="en-US" dirty="0" smtClean="0"/>
+              <a:rPr lang="en-US" b="1" dirty="0" err="1" smtClean="0"/>
+              <a:t>económicos</a:t>
+            </a:r>
+            <a:r>
+              <a:rPr lang="en-US" b="1" dirty="0" smtClean="0"/>
               <a:t> y </a:t>
             </a:r>
             <a:r>
-              <a:rPr lang="en-US" dirty="0" err="1" smtClean="0"/>
+              <a:rPr lang="en-US" b="1" dirty="0" err="1" smtClean="0"/>
               <a:t>para</a:t>
             </a:r>
             <a:r>
-              <a:rPr lang="en-US" dirty="0" smtClean="0"/>
+              <a:rPr lang="en-US" b="1" dirty="0" smtClean="0"/>
               <a:t> los </a:t>
             </a:r>
             <a:r>
-              <a:rPr lang="en-US" dirty="0" err="1" smtClean="0"/>
+              <a:rPr lang="en-US" b="1" dirty="0" err="1" smtClean="0"/>
               <a:t>usuarios</a:t>
             </a:r>
             <a:r>
-              <a:rPr lang="en-US" dirty="0" smtClean="0"/>
+              <a:rPr lang="en-US" b="1" dirty="0" smtClean="0"/>
               <a:t>:</a:t>
             </a:r>
           </a:p>
@@ -4316,16 +4803,57 @@
             <p:ph type="title"/>
           </p:nvPr>
         </p:nvSpPr>
-        <p:spPr/>
+        <p:spPr>
+          <a:xfrm>
+            <a:off x="395536" y="0"/>
+            <a:ext cx="8686800" cy="285728"/>
+          </a:xfrm>
+        </p:spPr>
         <p:txBody>
           <a:bodyPr/>
           <a:lstStyle/>
           <a:p>
             <a:r>
-              <a:rPr lang="en-US" smtClean="0"/>
-              <a:t>4. Descripción de la aplicación</a:t>
-            </a:r>
-            <a:endParaRPr lang="en-US"/>
+              <a:rPr lang="en-US" dirty="0" smtClean="0"/>
+              <a:t>4. </a:t>
+            </a:r>
+            <a:r>
+              <a:rPr lang="en-US" dirty="0" err="1" smtClean="0"/>
+              <a:t>Descripción</a:t>
+            </a:r>
+            <a:r>
+              <a:rPr lang="en-US" dirty="0" smtClean="0"/>
+              <a:t> de la </a:t>
+            </a:r>
+            <a:r>
+              <a:rPr lang="en-US" dirty="0" err="1" smtClean="0"/>
+              <a:t>aplicación</a:t>
+            </a:r>
+            <a:r>
+              <a:rPr lang="en-US" dirty="0" smtClean="0"/>
+              <a:t> (</a:t>
+            </a:r>
+            <a:r>
+              <a:rPr lang="en-US" dirty="0" err="1"/>
+              <a:t>F</a:t>
+            </a:r>
+            <a:r>
+              <a:rPr lang="en-US" dirty="0" err="1" smtClean="0"/>
+              <a:t>uncionamiento</a:t>
+            </a:r>
+            <a:r>
+              <a:rPr lang="en-US" dirty="0" smtClean="0"/>
+              <a:t> </a:t>
+            </a:r>
+            <a:r>
+              <a:rPr lang="en-US" dirty="0" err="1" smtClean="0"/>
+              <a:t>interno</a:t>
+            </a:r>
+            <a:r>
+              <a:rPr lang="en-US" dirty="0" smtClean="0"/>
+              <a:t>)</a:t>
+            </a:r>
+            <a:endParaRPr lang="en-US" dirty="0"/>
           </a:p>
         </p:txBody>
       </p:sp>
@@ -4386,10 +4914,154 @@
             <p:ph type="body" sz="quarter" idx="11"/>
           </p:nvPr>
         </p:nvSpPr>
-        <p:spPr/>
+        <p:spPr>
+          <a:xfrm>
+            <a:off x="684213" y="980728"/>
+            <a:ext cx="7920037" cy="2376264"/>
+          </a:xfrm>
+        </p:spPr>
         <p:txBody>
           <a:bodyPr/>
           <a:lstStyle/>
+          <a:p>
+            <a:pPr marL="0" indent="0">
+              <a:buNone/>
+            </a:pPr>
+            <a:r>
+              <a:rPr lang="es-ES_tradnl" dirty="0" smtClean="0">
+                <a:effectLst/>
+              </a:rPr>
+              <a:t>¿C</a:t>
+            </a:r>
+            <a:r>
+              <a:rPr lang="es-ES_tradnl" dirty="0" smtClean="0">
+                <a:effectLst/>
+              </a:rPr>
+              <a:t>ó</a:t>
+            </a:r>
+            <a:r>
+              <a:rPr lang="es-ES_tradnl" dirty="0" smtClean="0">
+                <a:effectLst/>
+              </a:rPr>
+              <a:t>mo funcionan aplicaciones de intercambios financieros, cu</a:t>
+            </a:r>
+            <a:r>
+              <a:rPr lang="es-ES_tradnl" dirty="0" smtClean="0">
+                <a:effectLst/>
+              </a:rPr>
+              <a:t>ál es la información de entrada y cuales son sus resultados</a:t>
+            </a:r>
+            <a:r>
+              <a:rPr lang="es-ES_tradnl" dirty="0" smtClean="0">
+                <a:effectLst/>
+              </a:rPr>
+              <a:t>? </a:t>
+            </a:r>
+          </a:p>
+          <a:p>
+            <a:pPr marL="0" indent="0">
+              <a:buNone/>
+            </a:pPr>
+            <a:endParaRPr lang="es-ES_tradnl" dirty="0" smtClean="0">
+              <a:effectLst/>
+            </a:endParaRPr>
+          </a:p>
+          <a:p>
+            <a:pPr marL="285750" indent="-285750">
+              <a:buFontTx/>
+              <a:buChar char="-"/>
+            </a:pPr>
+            <a:r>
+              <a:rPr lang="es-ES_tradnl" dirty="0" smtClean="0">
+                <a:effectLst/>
+              </a:rPr>
+              <a:t>Una </a:t>
+            </a:r>
+            <a:r>
+              <a:rPr lang="es-ES_tradnl" dirty="0">
+                <a:effectLst/>
+              </a:rPr>
+              <a:t>aplicación de intercambios financieros va a tener como información de entrada una conjunto de acciones de </a:t>
+            </a:r>
+            <a:r>
+              <a:rPr lang="es-ES_tradnl" dirty="0" smtClean="0">
+                <a:effectLst/>
+              </a:rPr>
+              <a:t>Mercado.</a:t>
+            </a:r>
+          </a:p>
+          <a:p>
+            <a:pPr marL="285750" indent="-285750">
+              <a:buFontTx/>
+              <a:buChar char="-"/>
+            </a:pPr>
+            <a:r>
+              <a:rPr lang="es-ES_tradnl" dirty="0" smtClean="0">
+                <a:effectLst/>
+              </a:rPr>
+              <a:t>La poblaci</a:t>
+            </a:r>
+            <a:r>
+              <a:rPr lang="es-ES_tradnl" dirty="0" smtClean="0">
+                <a:effectLst/>
+              </a:rPr>
+              <a:t>ón serán un conjunto de reglas de inversión.</a:t>
+            </a:r>
+            <a:endParaRPr lang="es-ES_tradnl" dirty="0" smtClean="0">
+              <a:effectLst/>
+            </a:endParaRPr>
+          </a:p>
+          <a:p>
+            <a:pPr marL="285750" indent="-285750">
+              <a:buFontTx/>
+              <a:buChar char="-"/>
+            </a:pPr>
+            <a:r>
+              <a:rPr lang="es-ES_tradnl" dirty="0" smtClean="0">
+                <a:effectLst/>
+              </a:rPr>
+              <a:t>Hace </a:t>
+            </a:r>
+            <a:r>
+              <a:rPr lang="es-ES_tradnl" dirty="0">
+                <a:effectLst/>
+              </a:rPr>
+              <a:t>uso de una serie de reglas de inversión -&gt; Tipo de dato = </a:t>
+            </a:r>
+            <a:r>
+              <a:rPr lang="es-ES_tradnl" dirty="0" smtClean="0">
+                <a:effectLst/>
+              </a:rPr>
+              <a:t>Arboles.</a:t>
+            </a:r>
+          </a:p>
+          <a:p>
+            <a:pPr marL="285750" indent="-285750">
+              <a:buFontTx/>
+              <a:buChar char="-"/>
+            </a:pPr>
+            <a:r>
+              <a:rPr lang="es-ES_tradnl" dirty="0">
+                <a:effectLst/>
+              </a:rPr>
+              <a:t>El objetivo es mejorar dichas reglas de </a:t>
+            </a:r>
+            <a:r>
+              <a:rPr lang="es-ES_tradnl" dirty="0" smtClean="0">
+                <a:effectLst/>
+              </a:rPr>
+              <a:t>inversión</a:t>
+            </a:r>
+            <a:r>
+              <a:rPr lang="es-ES_tradnl" dirty="0">
+                <a:effectLst/>
+              </a:rPr>
+              <a:t>.</a:t>
+            </a:r>
+            <a:endParaRPr lang="es-ES_tradnl" dirty="0" smtClean="0">
+              <a:effectLst/>
+            </a:endParaRPr>
+          </a:p>
           <a:p>
             <a:pPr marL="0" indent="0">
               <a:buNone/>
@@ -4457,7 +5129,7 @@
       </p:grpSpPr>
       <p:sp>
         <p:nvSpPr>
-          <p:cNvPr id="2" name="1 Título"/>
+          <p:cNvPr id="2" name="Título 1"/>
           <p:cNvSpPr>
             <a:spLocks noGrp="1"/>
           </p:cNvSpPr>
@@ -4471,29 +5143,56 @@
           <a:lstStyle/>
           <a:p>
             <a:r>
-              <a:rPr lang="en-US" smtClean="0"/>
-              <a:t>5. Referencias</a:t>
-            </a:r>
-            <a:endParaRPr lang="en-US"/>
-          </a:p>
-        </p:txBody>
-      </p:sp>
-      <p:sp>
-        <p:nvSpPr>
-          <p:cNvPr id="3" name="2 Marcador de contenido"/>
+              <a:rPr lang="en-US" dirty="0"/>
+              <a:t>4. </a:t>
+            </a:r>
+            <a:r>
+              <a:rPr lang="en-US" dirty="0" err="1"/>
+              <a:t>Descripción</a:t>
+            </a:r>
+            <a:r>
+              <a:rPr lang="en-US" dirty="0"/>
+              <a:t> de la </a:t>
+            </a:r>
+            <a:r>
+              <a:rPr lang="en-US" dirty="0" err="1"/>
+              <a:t>aplicación</a:t>
+            </a:r>
+            <a:r>
+              <a:rPr lang="en-US" dirty="0"/>
+              <a:t> (</a:t>
+            </a:r>
+            <a:r>
+              <a:rPr lang="en-US" dirty="0" err="1"/>
+              <a:t>Funcionamiento</a:t>
+            </a:r>
+            <a:r>
+              <a:rPr lang="en-US" dirty="0"/>
+              <a:t> </a:t>
+            </a:r>
+            <a:r>
+              <a:rPr lang="en-US" dirty="0" err="1"/>
+              <a:t>interno</a:t>
+            </a:r>
+            <a:r>
+              <a:rPr lang="en-US" dirty="0"/>
+              <a:t>)</a:t>
+            </a:r>
+            <a:endParaRPr lang="es-ES" dirty="0"/>
+          </a:p>
+        </p:txBody>
+      </p:sp>
+      <p:sp>
+        <p:nvSpPr>
+          <p:cNvPr id="3" name="Subtítulo 2"/>
           <p:cNvSpPr>
             <a:spLocks noGrp="1"/>
           </p:cNvSpPr>
           <p:nvPr>
-            <p:ph idx="10"/>
+            <p:ph type="subTitle" idx="10"/>
           </p:nvPr>
         </p:nvSpPr>
-        <p:spPr>
-          <a:xfrm>
-            <a:off x="755650" y="300038"/>
-            <a:ext cx="8232775" cy="214312"/>
-          </a:xfrm>
-        </p:spPr>
+        <p:spPr/>
         <p:txBody>
           <a:bodyPr/>
           <a:lstStyle/>
@@ -4532,7 +5231,7 @@
       </p:sp>
       <p:sp>
         <p:nvSpPr>
-          <p:cNvPr id="7" name="6 Marcador de texto"/>
+          <p:cNvPr id="4" name="Marcador de texto 3"/>
           <p:cNvSpPr>
             <a:spLocks noGrp="1"/>
           </p:cNvSpPr>
@@ -4540,210 +5239,487 @@
             <p:ph type="body" sz="quarter" idx="11"/>
           </p:nvPr>
         </p:nvSpPr>
-        <p:spPr/>
+        <p:spPr>
+          <a:xfrm>
+            <a:off x="683568" y="836712"/>
+            <a:ext cx="3959795" cy="5472608"/>
+          </a:xfrm>
+        </p:spPr>
         <p:txBody>
           <a:bodyPr/>
           <a:lstStyle/>
           <a:p>
-            <a:pPr>
+            <a:pPr marL="0" indent="0">
               <a:buNone/>
             </a:pPr>
             <a:r>
-              <a:rPr lang="en-US" sz="1200" smtClean="0"/>
-              <a:t>Indicar las referencias de documentos (libros, artículos, etc), páginas web, blogs , ... consultados.</a:t>
-            </a:r>
-          </a:p>
-          <a:p>
-            <a:r>
-              <a:rPr lang="en-US" sz="1200" smtClean="0"/>
-              <a:t>Artículo: &lt;Título&gt;&lt;Autores&gt;&lt;Publicación&gt;&lt;Año&gt;&lt;Páginas&gt;&lt;url o DOI, si la hay&gt;. Ejemplo:</a:t>
-            </a:r>
-          </a:p>
-          <a:p>
-            <a:pPr lvl="1"/>
-            <a:r>
-              <a:rPr lang="en-US" sz="1200" smtClean="0"/>
-              <a:t>S. Brin y L. Page, «The anatomy of a large-scale hypertextual Web search engine* 1», </a:t>
-            </a:r>
-            <a:r>
-              <a:rPr lang="en-US" sz="1200" i="1" smtClean="0"/>
-              <a:t>Computer networks and ISDN systems</a:t>
-            </a:r>
-            <a:r>
-              <a:rPr lang="en-US" sz="1200" smtClean="0"/>
-              <a:t>, vol. 30, n.</a:t>
-            </a:r>
-            <a:r>
-              <a:rPr lang="en-US" sz="1200" baseline="30000" smtClean="0"/>
-              <a:t>o</a:t>
-            </a:r>
-            <a:r>
-              <a:rPr lang="en-US" sz="1200" smtClean="0"/>
-              <a:t> 1-7, pp. 107–117, 1998. URL: </a:t>
-            </a:r>
-            <a:r>
-              <a:rPr lang="en-US" sz="1200" smtClean="0">
-                <a:hlinkClick r:id="rId2"/>
+              <a:rPr lang="es-ES" b="1" dirty="0">
+                <a:latin typeface="DejaVu Sans" pitchFamily="34" charset="0"/>
               </a:rPr>
-              <a:t>http://infolab.stanford.edu/~backrub/google.html</a:t>
-            </a:r>
-            <a:r>
-              <a:rPr lang="en-US" sz="1200" smtClean="0"/>
-              <a:t>. DOI: </a:t>
-            </a:r>
-            <a:r>
-              <a:rPr lang="es-ES" sz="1200" smtClean="0">
-                <a:hlinkClick r:id="rId3"/>
+              <a:t>Procedimiento Interno</a:t>
+            </a:r>
+            <a:r>
+              <a:rPr lang="es-ES" b="1" dirty="0" smtClean="0">
+                <a:latin typeface="DejaVu Sans" pitchFamily="34" charset="0"/>
               </a:rPr>
-              <a:t>10.1016/S0169-7552(98)00110-X</a:t>
-            </a:r>
-            <a:endParaRPr lang="en-US" sz="1200" smtClean="0"/>
-          </a:p>
-          <a:p>
-            <a:r>
-              <a:rPr lang="en-US" sz="1200" smtClean="0"/>
-              <a:t>Libro:&lt;Titulo del libro&gt;&lt;Capítulo consultado&gt; &lt;Autores&gt;&lt;Editorial&gt;&lt;Año&gt;&lt;url o DOI, si la hay&gt;, ejemplo:</a:t>
-            </a:r>
-          </a:p>
-          <a:p>
-            <a:pPr lvl="1">
-              <a:spcBef>
-                <a:spcPts val="0"/>
-              </a:spcBef>
-            </a:pPr>
-            <a:r>
-              <a:rPr lang="en-US" sz="1200" smtClean="0"/>
-              <a:t>R. P. Goebel, </a:t>
-            </a:r>
-            <a:r>
-              <a:rPr lang="en-US" sz="1200" i="1" smtClean="0"/>
-              <a:t>ROS By Example Volume 2 - HYDRO</a:t>
-            </a:r>
-            <a:r>
-              <a:rPr lang="en-US" sz="1200" smtClean="0"/>
-              <a:t>. Cap: Robot Vision. Editorial Lulo. 2014. </a:t>
-            </a:r>
-            <a:r>
-              <a:rPr lang="en-US" sz="1200" smtClean="0">
-                <a:hlinkClick r:id="rId4"/>
-              </a:rPr>
-              <a:t>http://www.lulu.com/shop/r-patrick-goebel/ros-by-example-volume-2-hydro/ebook/product-21837577.html</a:t>
-            </a:r>
-            <a:endParaRPr lang="en-US" sz="1200" smtClean="0"/>
-          </a:p>
-          <a:p>
-            <a:pPr lvl="1"/>
-            <a:endParaRPr lang="en-US" sz="1200" smtClean="0"/>
-          </a:p>
-          <a:p>
-            <a:r>
-              <a:rPr lang="en-US" sz="1200" smtClean="0"/>
-              <a:t>Página web: &lt;Título de la página&gt;&lt;Autores&gt;&lt;Año&gt;&lt;url&gt;. Ejemplo:</a:t>
-            </a:r>
-          </a:p>
-          <a:p>
-            <a:pPr lvl="1"/>
-            <a:r>
-              <a:rPr lang="en-US" sz="1200" smtClean="0"/>
-              <a:t>ROS Tutorials. Ros Org. </a:t>
-            </a:r>
-            <a:r>
-              <a:rPr lang="es-ES" sz="1200" smtClean="0">
-                <a:hlinkClick r:id="rId5"/>
-              </a:rPr>
-              <a:t>http://wiki.ros.org/ROS/Tutorials</a:t>
-            </a:r>
-            <a:endParaRPr lang="en-US" sz="1200" smtClean="0"/>
-          </a:p>
-          <a:p>
-            <a:r>
-              <a:rPr lang="en-US" sz="1200" smtClean="0"/>
-              <a:t>Entrada de Blog: &lt;Título del Blog&gt;&lt;Título de la Entrada&gt;&lt;Autores&gt;&lt;Año&gt;&lt;url&gt;. Ejemplo:</a:t>
-            </a:r>
-          </a:p>
-          <a:p>
-            <a:pPr lvl="1"/>
-            <a:r>
-              <a:rPr lang="en-US" sz="1200" smtClean="0"/>
-              <a:t>Kurzweil Accelerating Intelligence. </a:t>
-            </a:r>
-            <a:r>
-              <a:rPr lang="en-US" sz="1200" b="1" smtClean="0"/>
-              <a:t>Ray Kurzweil’s music-tech breakthroughs: the inside story. </a:t>
-            </a:r>
-            <a:r>
-              <a:rPr lang="en-US" sz="1200" smtClean="0"/>
-              <a:t>Febrero 2015. </a:t>
-            </a:r>
-            <a:r>
-              <a:rPr lang="es-ES" sz="1200" smtClean="0">
-                <a:hlinkClick r:id="rId6"/>
-              </a:rPr>
-              <a:t>http://www.kurzweilai.net/ray-kurzweils-music-tech-breakthroughs-the-inside-story</a:t>
-            </a:r>
-            <a:endParaRPr lang="en-US" sz="1200" smtClean="0"/>
-          </a:p>
-          <a:p>
-            <a:endParaRPr lang="en-US" sz="1200" smtClean="0"/>
-          </a:p>
-          <a:p>
-            <a:pPr>
+              <a:t>:</a:t>
+            </a:r>
+          </a:p>
+          <a:p>
+            <a:pPr marL="0" indent="0">
               <a:buNone/>
             </a:pPr>
-            <a:r>
-              <a:rPr lang="en-US" sz="1200" smtClean="0"/>
-              <a:t>Nota: no abusar de la Wikipedia, usarla como punto de entrada a la búsqueda, si es necesario. Usar solo entradas de Wikipedia indica poca profundidad en el proceso de documentación y búsqueda bibliográfica.</a:t>
-            </a:r>
-          </a:p>
-          <a:p>
-            <a:endParaRPr lang="en-US" sz="1200"/>
-          </a:p>
-        </p:txBody>
-      </p:sp>
-      <p:sp>
-        <p:nvSpPr>
-          <p:cNvPr id="4" name="3 Marcador de número de diapositiva"/>
-          <p:cNvSpPr>
-            <a:spLocks noGrp="1"/>
-          </p:cNvSpPr>
-          <p:nvPr>
-            <p:ph type="sldNum" sz="quarter" idx="4294967295"/>
-          </p:nvPr>
-        </p:nvSpPr>
+            <a:endParaRPr lang="es-ES" dirty="0">
+              <a:latin typeface="DejaVu Sans" pitchFamily="34" charset="0"/>
+            </a:endParaRPr>
+          </a:p>
+          <a:p>
+            <a:pPr marL="342900" lvl="0" indent="-342900"/>
+            <a:r>
+              <a:rPr lang="es-ES" dirty="0">
+                <a:latin typeface="DejaVu Sans" pitchFamily="34" charset="0"/>
+              </a:rPr>
+              <a:t>Creación de la población inicial usando reglas de inversión aleatorias (Se comprueba la calidad “</a:t>
+            </a:r>
+            <a:r>
+              <a:rPr lang="es-ES" dirty="0" err="1">
+                <a:latin typeface="DejaVu Sans" pitchFamily="34" charset="0"/>
+              </a:rPr>
+              <a:t>fitness</a:t>
+            </a:r>
+            <a:r>
+              <a:rPr lang="es-ES" dirty="0">
+                <a:latin typeface="DejaVu Sans" pitchFamily="34" charset="0"/>
+              </a:rPr>
+              <a:t>”).</a:t>
+            </a:r>
+            <a:r>
+              <a:rPr lang="es-ES_tradnl" dirty="0">
+                <a:latin typeface="Eras Bold ITC"/>
+                <a:cs typeface="Eras Bold ITC"/>
+              </a:rPr>
+              <a:t> </a:t>
+            </a:r>
+          </a:p>
+          <a:p>
+            <a:pPr marL="342900" indent="-342900">
+              <a:buFontTx/>
+              <a:buAutoNum type="arabicPeriod"/>
+            </a:pPr>
+            <a:r>
+              <a:rPr lang="es-ES_tradnl" dirty="0">
+                <a:latin typeface="Eras Bold ITC"/>
+                <a:cs typeface="Eras Bold ITC"/>
+              </a:rPr>
+              <a:t>Tomamos la mejor regla se establece como </a:t>
+            </a:r>
+            <a:r>
+              <a:rPr lang="es-ES_tradnl" dirty="0" smtClean="0">
+                <a:latin typeface="Eras Bold ITC"/>
+                <a:cs typeface="Eras Bold ITC"/>
+              </a:rPr>
+              <a:t>principal.</a:t>
+            </a:r>
+            <a:endParaRPr lang="es-ES" dirty="0"/>
+          </a:p>
+          <a:p>
+            <a:pPr marL="342900" indent="-342900">
+              <a:buFontTx/>
+              <a:buAutoNum type="arabicPeriod"/>
+            </a:pPr>
+            <a:r>
+              <a:rPr lang="es-ES" dirty="0" smtClean="0"/>
+              <a:t>Se toman nuevas reglas de forma aleatoria, se llevan a cabo mutaciones y recombinaciones.</a:t>
+            </a:r>
+          </a:p>
+          <a:p>
+            <a:pPr marL="342900" indent="-342900">
+              <a:buFontTx/>
+              <a:buAutoNum type="arabicPeriod"/>
+            </a:pPr>
+            <a:r>
+              <a:rPr lang="es-ES" dirty="0" smtClean="0"/>
+              <a:t>Se recalcula la calidad de las nuevas reglas obtenidas en el paso anterior.</a:t>
+            </a:r>
+          </a:p>
+          <a:p>
+            <a:endParaRPr lang="es-ES" dirty="0" smtClean="0"/>
+          </a:p>
+          <a:p>
+            <a:endParaRPr lang="es-ES" dirty="0" smtClean="0"/>
+          </a:p>
+          <a:p>
+            <a:endParaRPr lang="es-ES" dirty="0" smtClean="0"/>
+          </a:p>
+          <a:p>
+            <a:pPr marL="0" indent="0">
+              <a:buNone/>
+            </a:pPr>
+            <a:endParaRPr lang="es-ES" dirty="0" smtClean="0"/>
+          </a:p>
+        </p:txBody>
+      </p:sp>
+      <p:pic>
+        <p:nvPicPr>
+          <p:cNvPr id="5" name="Imagen 4" descr="arbolBinario.gif"/>
+          <p:cNvPicPr>
+            <a:picLocks noChangeAspect="1"/>
+          </p:cNvPicPr>
+          <p:nvPr/>
+        </p:nvPicPr>
+        <p:blipFill>
+          <a:blip r:embed="rId2">
+            <a:extLst>
+              <a:ext uri="{28A0092B-C50C-407E-A947-70E740481C1C}">
+                <a14:useLocalDpi xmlns:a14="http://schemas.microsoft.com/office/drawing/2010/main" val="0"/>
+              </a:ext>
+            </a:extLst>
+          </a:blip>
+          <a:stretch>
+            <a:fillRect/>
+          </a:stretch>
+        </p:blipFill>
         <p:spPr>
           <a:xfrm>
-            <a:off x="7010400" y="6356350"/>
-            <a:ext cx="2133600" cy="365125"/>
+            <a:off x="5580112" y="3501008"/>
+            <a:ext cx="2376264" cy="2115546"/>
           </a:xfrm>
           <a:prstGeom prst="rect">
             <a:avLst/>
           </a:prstGeom>
         </p:spPr>
-        <p:txBody>
-          <a:bodyPr/>
+      </p:pic>
+      <p:sp>
+        <p:nvSpPr>
+          <p:cNvPr id="7" name="CuadroTexto 6"/>
+          <p:cNvSpPr txBox="1"/>
+          <p:nvPr/>
+        </p:nvSpPr>
+        <p:spPr>
+          <a:xfrm>
+            <a:off x="5580112" y="2780928"/>
+            <a:ext cx="2520280" cy="369332"/>
+          </a:xfrm>
+          <a:prstGeom prst="rect">
+            <a:avLst/>
+          </a:prstGeom>
+          <a:noFill/>
+        </p:spPr>
+        <p:txBody>
+          <a:bodyPr wrap="square" rtlCol="0">
+            <a:spAutoFit/>
+          </a:bodyPr>
           <a:lstStyle/>
           <a:p>
-            <a:fld id="{3ECF9D19-8B94-437E-9A3D-4B8D46B69AB6}" type="slidenum">
-              <a:rPr lang="en-US" smtClean="0"/>
-              <a:pPr/>
-              <a:t>8</a:t>
-            </a:fld>
-            <a:endParaRPr lang="en-US"/>
-          </a:p>
-        </p:txBody>
-      </p:sp>
+            <a:r>
+              <a:rPr lang="es-ES" dirty="0" smtClean="0">
+                <a:solidFill>
+                  <a:srgbClr val="0F2C5C"/>
+                </a:solidFill>
+                <a:latin typeface="DejaVu Sans" pitchFamily="34" charset="0"/>
+                <a:ea typeface="DejaVu Sans" pitchFamily="34" charset="0"/>
+                <a:cs typeface="DejaVu Sans" pitchFamily="34" charset="0"/>
+              </a:rPr>
+              <a:t>Ejemplo mutaci</a:t>
+            </a:r>
+            <a:r>
+              <a:rPr lang="es-ES" dirty="0" smtClean="0">
+                <a:solidFill>
+                  <a:srgbClr val="0F2C5C"/>
+                </a:solidFill>
+                <a:latin typeface="DejaVu Sans" pitchFamily="34" charset="0"/>
+                <a:ea typeface="DejaVu Sans" pitchFamily="34" charset="0"/>
+                <a:cs typeface="DejaVu Sans" pitchFamily="34" charset="0"/>
+              </a:rPr>
+              <a:t>ón</a:t>
+            </a:r>
+            <a:endParaRPr lang="es-ES" dirty="0" smtClean="0">
+              <a:solidFill>
+                <a:srgbClr val="0F2C5C"/>
+              </a:solidFill>
+              <a:latin typeface="DejaVu Sans" pitchFamily="34" charset="0"/>
+              <a:ea typeface="DejaVu Sans" pitchFamily="34" charset="0"/>
+              <a:cs typeface="DejaVu Sans" pitchFamily="34" charset="0"/>
+            </a:endParaRPr>
+          </a:p>
+        </p:txBody>
+      </p:sp>
+      <p:pic>
+        <p:nvPicPr>
+          <p:cNvPr id="8" name="Imagen 7" descr="mutacion.gif"/>
+          <p:cNvPicPr>
+            <a:picLocks noChangeAspect="1"/>
+          </p:cNvPicPr>
+          <p:nvPr/>
+        </p:nvPicPr>
+        <p:blipFill>
+          <a:blip r:embed="rId3">
+            <a:extLst>
+              <a:ext uri="{28A0092B-C50C-407E-A947-70E740481C1C}">
+                <a14:useLocalDpi xmlns:a14="http://schemas.microsoft.com/office/drawing/2010/main" val="0"/>
+              </a:ext>
+            </a:extLst>
+          </a:blip>
+          <a:stretch>
+            <a:fillRect/>
+          </a:stretch>
+        </p:blipFill>
+        <p:spPr>
+          <a:xfrm>
+            <a:off x="5220072" y="1340768"/>
+            <a:ext cx="3347931" cy="1279525"/>
+          </a:xfrm>
+          <a:prstGeom prst="rect">
+            <a:avLst/>
+          </a:prstGeom>
+        </p:spPr>
+      </p:pic>
     </p:spTree>
+    <p:extLst>
+      <p:ext uri="{BB962C8B-B14F-4D97-AF65-F5344CB8AC3E}">
+        <p14:creationId xmlns:p14="http://schemas.microsoft.com/office/powerpoint/2010/main" val="2657227507"/>
+      </p:ext>
+    </p:extLst>
   </p:cSld>
   <p:clrMapOvr>
     <a:masterClrMapping/>
   </p:clrMapOvr>
-  <p:timing>
-    <p:tnLst>
-      <p:par>
-        <p:cTn xmlns:p14="http://schemas.microsoft.com/office/powerpoint/2010/main" id="1" dur="indefinite" restart="never" nodeType="tmRoot"/>
-      </p:par>
-    </p:tnLst>
-  </p:timing>
+</p:sld>
+</file>
+
+<file path=ppt/slides/slide9.xml><?xml version="1.0" encoding="utf-8"?>
+<p:sld xmlns:a="http://schemas.openxmlformats.org/drawingml/2006/main" xmlns:r="http://schemas.openxmlformats.org/officeDocument/2006/relationships" xmlns:p="http://schemas.openxmlformats.org/presentationml/2006/main">
+  <p:cSld>
+    <p:spTree>
+      <p:nvGrpSpPr>
+        <p:cNvPr id="1" name=""/>
+        <p:cNvGrpSpPr/>
+        <p:nvPr/>
+      </p:nvGrpSpPr>
+      <p:grpSpPr>
+        <a:xfrm>
+          <a:off x="0" y="0"/>
+          <a:ext cx="0" cy="0"/>
+          <a:chOff x="0" y="0"/>
+          <a:chExt cx="0" cy="0"/>
+        </a:xfrm>
+      </p:grpSpPr>
+      <p:sp>
+        <p:nvSpPr>
+          <p:cNvPr id="2" name="Título 1"/>
+          <p:cNvSpPr>
+            <a:spLocks noGrp="1"/>
+          </p:cNvSpPr>
+          <p:nvPr>
+            <p:ph type="title"/>
+          </p:nvPr>
+        </p:nvSpPr>
+        <p:spPr/>
+        <p:txBody>
+          <a:bodyPr/>
+          <a:lstStyle/>
+          <a:p>
+            <a:endParaRPr lang="es-ES"/>
+          </a:p>
+        </p:txBody>
+      </p:sp>
+      <p:sp>
+        <p:nvSpPr>
+          <p:cNvPr id="3" name="Subtítulo 2"/>
+          <p:cNvSpPr>
+            <a:spLocks noGrp="1"/>
+          </p:cNvSpPr>
+          <p:nvPr>
+            <p:ph type="subTitle" idx="10"/>
+          </p:nvPr>
+        </p:nvSpPr>
+        <p:spPr/>
+        <p:txBody>
+          <a:bodyPr/>
+          <a:lstStyle/>
+          <a:p>
+            <a:endParaRPr lang="es-ES"/>
+          </a:p>
+        </p:txBody>
+      </p:sp>
+      <p:sp>
+        <p:nvSpPr>
+          <p:cNvPr id="4" name="Marcador de texto 3"/>
+          <p:cNvSpPr>
+            <a:spLocks noGrp="1"/>
+          </p:cNvSpPr>
+          <p:nvPr>
+            <p:ph type="body" sz="quarter" idx="11"/>
+          </p:nvPr>
+        </p:nvSpPr>
+        <p:spPr>
+          <a:xfrm>
+            <a:off x="611560" y="1268760"/>
+            <a:ext cx="3959795" cy="4968552"/>
+          </a:xfrm>
+        </p:spPr>
+        <p:txBody>
+          <a:bodyPr/>
+          <a:lstStyle/>
+          <a:p>
+            <a:pPr>
+              <a:buFont typeface="+mj-lt"/>
+              <a:buAutoNum type="arabicPeriod" startAt="5"/>
+            </a:pPr>
+            <a:r>
+              <a:rPr lang="es-ES" dirty="0"/>
+              <a:t>Se comparan con el conjunto de reglas, se intercambian la de peor calidad por otra de mejor calidad obtenidas con mutación y recombinación</a:t>
+            </a:r>
+            <a:r>
+              <a:rPr lang="es-ES" dirty="0" smtClean="0"/>
+              <a:t>.</a:t>
+            </a:r>
+          </a:p>
+          <a:p>
+            <a:pPr>
+              <a:buFont typeface="+mj-lt"/>
+              <a:buAutoNum type="arabicPeriod" startAt="5"/>
+            </a:pPr>
+            <a:r>
+              <a:rPr lang="es-ES" dirty="0" smtClean="0"/>
+              <a:t>Se </a:t>
+            </a:r>
+            <a:r>
+              <a:rPr lang="es-ES" dirty="0"/>
+              <a:t>repite el proceso hasta alcanzar el número de reglas.</a:t>
+            </a:r>
+          </a:p>
+          <a:p>
+            <a:pPr>
+              <a:buFont typeface="+mj-lt"/>
+              <a:buAutoNum type="arabicPeriod" startAt="5"/>
+            </a:pPr>
+            <a:r>
+              <a:rPr lang="es-ES" dirty="0"/>
+              <a:t>Una vez hecho esto si se encuentra una regla mejor a la establecida como principal se sustituye.</a:t>
+            </a:r>
+          </a:p>
+          <a:p>
+            <a:pPr>
+              <a:buFont typeface="+mj-lt"/>
+              <a:buAutoNum type="arabicPeriod" startAt="5"/>
+            </a:pPr>
+            <a:r>
+              <a:rPr lang="es-ES" dirty="0"/>
+              <a:t>Se repite desde el paso 3 hasta alcanzar el limite de generaciones.</a:t>
+            </a:r>
+          </a:p>
+          <a:p>
+            <a:endParaRPr lang="es-ES" dirty="0"/>
+          </a:p>
+        </p:txBody>
+      </p:sp>
+      <p:pic>
+        <p:nvPicPr>
+          <p:cNvPr id="5" name="Imagen 4" descr="cruce1.png"/>
+          <p:cNvPicPr>
+            <a:picLocks noChangeAspect="1"/>
+          </p:cNvPicPr>
+          <p:nvPr/>
+        </p:nvPicPr>
+        <p:blipFill>
+          <a:blip r:embed="rId2">
+            <a:extLst>
+              <a:ext uri="{28A0092B-C50C-407E-A947-70E740481C1C}">
+                <a14:useLocalDpi xmlns:a14="http://schemas.microsoft.com/office/drawing/2010/main" val="0"/>
+              </a:ext>
+            </a:extLst>
+          </a:blip>
+          <a:stretch>
+            <a:fillRect/>
+          </a:stretch>
+        </p:blipFill>
+        <p:spPr>
+          <a:xfrm>
+            <a:off x="4788024" y="2276872"/>
+            <a:ext cx="4139952" cy="2527580"/>
+          </a:xfrm>
+          <a:prstGeom prst="rect">
+            <a:avLst/>
+          </a:prstGeom>
+        </p:spPr>
+      </p:pic>
+      <p:sp>
+        <p:nvSpPr>
+          <p:cNvPr id="6" name="CuadroTexto 5"/>
+          <p:cNvSpPr txBox="1"/>
+          <p:nvPr/>
+        </p:nvSpPr>
+        <p:spPr>
+          <a:xfrm>
+            <a:off x="5652120" y="4941168"/>
+            <a:ext cx="2592288" cy="646331"/>
+          </a:xfrm>
+          <a:prstGeom prst="rect">
+            <a:avLst/>
+          </a:prstGeom>
+          <a:noFill/>
+        </p:spPr>
+        <p:txBody>
+          <a:bodyPr wrap="square" rtlCol="0">
+            <a:spAutoFit/>
+          </a:bodyPr>
+          <a:lstStyle/>
+          <a:p>
+            <a:r>
+              <a:rPr lang="es-ES" dirty="0" smtClean="0">
+                <a:solidFill>
+                  <a:srgbClr val="0F2C5C"/>
+                </a:solidFill>
+                <a:latin typeface="DejaVu Sans" pitchFamily="34" charset="0"/>
+                <a:ea typeface="DejaVu Sans" pitchFamily="34" charset="0"/>
+                <a:cs typeface="DejaVu Sans" pitchFamily="34" charset="0"/>
+              </a:rPr>
+              <a:t>Ejemplo recombinaci</a:t>
+            </a:r>
+            <a:r>
+              <a:rPr lang="es-ES" dirty="0" smtClean="0">
+                <a:solidFill>
+                  <a:srgbClr val="0F2C5C"/>
+                </a:solidFill>
+                <a:latin typeface="DejaVu Sans" pitchFamily="34" charset="0"/>
+                <a:ea typeface="DejaVu Sans" pitchFamily="34" charset="0"/>
+                <a:cs typeface="DejaVu Sans" pitchFamily="34" charset="0"/>
+              </a:rPr>
+              <a:t>ón </a:t>
+            </a:r>
+            <a:r>
+              <a:rPr lang="es-ES" dirty="0" smtClean="0">
+                <a:solidFill>
+                  <a:srgbClr val="0F2C5C"/>
+                </a:solidFill>
+                <a:latin typeface="DejaVu Sans" pitchFamily="34" charset="0"/>
+                <a:ea typeface="DejaVu Sans" pitchFamily="34" charset="0"/>
+                <a:cs typeface="DejaVu Sans" pitchFamily="34" charset="0"/>
+              </a:rPr>
+              <a:t>(cruce)</a:t>
+            </a:r>
+            <a:endParaRPr lang="es-ES" dirty="0" smtClean="0">
+              <a:solidFill>
+                <a:srgbClr val="0F2C5C"/>
+              </a:solidFill>
+              <a:latin typeface="DejaVu Sans" pitchFamily="34" charset="0"/>
+              <a:ea typeface="DejaVu Sans" pitchFamily="34" charset="0"/>
+              <a:cs typeface="DejaVu Sans" pitchFamily="34" charset="0"/>
+            </a:endParaRPr>
+          </a:p>
+        </p:txBody>
+      </p:sp>
+    </p:spTree>
+    <p:extLst>
+      <p:ext uri="{BB962C8B-B14F-4D97-AF65-F5344CB8AC3E}">
+        <p14:creationId xmlns:p14="http://schemas.microsoft.com/office/powerpoint/2010/main" val="3532149702"/>
+      </p:ext>
+    </p:extLst>
+  </p:cSld>
+  <p:clrMapOvr>
+    <a:masterClrMapping/>
+  </p:clrMapOvr>
 </p:sld>
 </file>
 

</xml_diff>